<commit_message>
2020-2021 School Update #5
</commit_message>
<xml_diff>
--- a/High School/Photography/Unit 1 - Introduction & History/Section 1 - Syllabus Overview and Classroom Operation/Assets/Unit 1 - Section 1 - Syllabus.pptx
+++ b/High School/Photography/Unit 1 - Introduction & History/Section 1 - Syllabus Overview and Classroom Operation/Assets/Unit 1 - Section 1 - Syllabus.pptx
@@ -12,9 +12,9 @@
   </p:handoutMasterIdLst>
   <p:sldIdLst>
     <p:sldId id="268" r:id="rId2"/>
-    <p:sldId id="269" r:id="rId3"/>
-    <p:sldId id="272" r:id="rId4"/>
-    <p:sldId id="271" r:id="rId5"/>
+    <p:sldId id="273" r:id="rId3"/>
+    <p:sldId id="269" r:id="rId4"/>
+    <p:sldId id="272" r:id="rId5"/>
     <p:sldId id="270" r:id="rId6"/>
   </p:sldIdLst>
   <p:sldSz cx="12192000" cy="6858000"/>
@@ -218,7 +218,7 @@
           <a:p>
             <a:fld id="{6AC4FB8F-ED15-48AB-97BD-17129D4E699D}" type="datetimeFigureOut">
               <a:rPr lang="en-US" smtClean="0"/>
-              <a:t>9/6/2018</a:t>
+              <a:t>9/9/20</a:t>
             </a:fld>
             <a:endParaRPr lang="en-US" dirty="0"/>
           </a:p>
@@ -383,7 +383,7 @@
           <a:p>
             <a:fld id="{BBC9D437-CD83-4825-AD0D-5E7B341BC79B}" type="datetimeFigureOut">
               <a:rPr lang="en-US" smtClean="0"/>
-              <a:t>9/6/2018</a:t>
+              <a:t>9/9/20</a:t>
             </a:fld>
             <a:endParaRPr lang="en-US" dirty="0"/>
           </a:p>
@@ -809,7 +809,7 @@
           <a:p>
             <a:fld id="{85AB7CBB-843F-464A-A764-71D6ADC27CFA}" type="datetime1">
               <a:rPr lang="en-US" smtClean="0"/>
-              <a:t>9/6/2018</a:t>
+              <a:t>9/9/20</a:t>
             </a:fld>
             <a:endParaRPr lang="en-US" dirty="0"/>
           </a:p>
@@ -994,7 +994,7 @@
           <a:p>
             <a:fld id="{CBEFC03D-3A1F-4813-9337-02411FCC3A9A}" type="datetime1">
               <a:rPr lang="en-US" smtClean="0"/>
-              <a:t>9/6/2018</a:t>
+              <a:t>9/9/20</a:t>
             </a:fld>
             <a:endParaRPr lang="en-US" dirty="0"/>
           </a:p>
@@ -1192,7 +1192,7 @@
           <a:p>
             <a:fld id="{3D638F79-DFA0-4C26-9553-23A017B69AB6}" type="datetime1">
               <a:rPr lang="en-US" smtClean="0"/>
-              <a:t>9/6/2018</a:t>
+              <a:t>9/9/20</a:t>
             </a:fld>
             <a:endParaRPr lang="en-US" dirty="0"/>
           </a:p>
@@ -1386,7 +1386,7 @@
           <a:p>
             <a:fld id="{A70B34E7-E1D9-4FBF-A1A0-4009669A00BF}" type="datetime1">
               <a:rPr lang="en-US" smtClean="0"/>
-              <a:t>9/6/2018</a:t>
+              <a:t>9/9/20</a:t>
             </a:fld>
             <a:endParaRPr lang="en-US" dirty="0"/>
           </a:p>
@@ -1875,7 +1875,7 @@
           <a:p>
             <a:fld id="{7579E8B6-2F47-420B-83EA-EB2285D13EC9}" type="datetime1">
               <a:rPr lang="en-US" smtClean="0"/>
-              <a:t>9/6/2018</a:t>
+              <a:t>9/9/20</a:t>
             </a:fld>
             <a:endParaRPr lang="en-US" dirty="0"/>
           </a:p>
@@ -2313,7 +2313,7 @@
           <a:p>
             <a:fld id="{2304803D-B10E-4B90-8456-A0E05393E233}" type="datetime1">
               <a:rPr lang="en-US" smtClean="0"/>
-              <a:t>9/6/2018</a:t>
+              <a:t>9/9/20</a:t>
             </a:fld>
             <a:endParaRPr lang="en-US" dirty="0"/>
           </a:p>
@@ -2446,7 +2446,7 @@
           <a:p>
             <a:fld id="{CCE1E62F-6CCE-4064-96C2-2084AF883904}" type="datetime1">
               <a:rPr lang="en-US" smtClean="0"/>
-              <a:t>9/6/2018</a:t>
+              <a:t>9/9/20</a:t>
             </a:fld>
             <a:endParaRPr lang="en-US" dirty="0"/>
           </a:p>
@@ -2556,7 +2556,7 @@
           <a:p>
             <a:fld id="{AA615CA6-EC4D-4728-8AA6-534BE7E9B67C}" type="datetime1">
               <a:rPr lang="en-US" smtClean="0"/>
-              <a:t>9/6/2018</a:t>
+              <a:t>9/9/20</a:t>
             </a:fld>
             <a:endParaRPr lang="en-US" dirty="0"/>
           </a:p>
@@ -2870,7 +2870,7 @@
           <a:p>
             <a:fld id="{A6139942-0A2E-443A-842F-D6DE74360370}" type="datetime1">
               <a:rPr lang="en-US" smtClean="0"/>
-              <a:t>9/6/2018</a:t>
+              <a:t>9/9/20</a:t>
             </a:fld>
             <a:endParaRPr lang="en-US" dirty="0"/>
           </a:p>
@@ -3387,7 +3387,7 @@
           <a:p>
             <a:fld id="{3F138946-C5C1-4A11-BA69-F12F43F8A94B}" type="datetime1">
               <a:rPr lang="en-US" smtClean="0"/>
-              <a:t>9/6/2018</a:t>
+              <a:t>9/9/20</a:t>
             </a:fld>
             <a:endParaRPr lang="en-US" dirty="0"/>
           </a:p>
@@ -3802,7 +3802,7 @@
       </a:lvl9pPr>
     </p:otherStyle>
   </p:txStyles>
-  <p:extLst mod="1">
+  <p:extLst>
     <p:ext uri="{27BBF7A9-308A-43DC-89C8-2F10F3537804}">
       <p15:sldGuideLst xmlns:p15="http://schemas.microsoft.com/office/powerpoint/2012/main">
         <p15:guide id="1" orient="horz" pos="2160" userDrawn="1">
@@ -3860,14 +3860,15 @@
           <a:p>
             <a:r>
               <a:rPr lang="en-US" dirty="0"/>
-              <a:t>Photography</a:t>
-            </a:r>
-            <a:br>
+              <a:t>8</a:t>
+            </a:r>
+            <a:r>
+              <a:rPr lang="en-US" baseline="30000" dirty="0"/>
+              <a:t>th</a:t>
+            </a:r>
+            <a:r>
               <a:rPr lang="en-US" dirty="0"/>
-            </a:br>
-            <a:r>
-              <a:rPr lang="en-US" dirty="0"/>
-              <a:t>ADV Photography</a:t>
+              <a:t> Grade Technology</a:t>
             </a:r>
           </a:p>
         </p:txBody>
@@ -3891,7 +3892,7 @@
           <a:p>
             <a:r>
               <a:rPr lang="en-US" dirty="0"/>
-              <a:t>Unit 1 – Introduction &amp; History</a:t>
+              <a:t>Unit 1 – Introduction</a:t>
             </a:r>
           </a:p>
           <a:p>
@@ -3977,6 +3978,180 @@
       </p:grpSpPr>
       <p:sp>
         <p:nvSpPr>
+          <p:cNvPr id="2" name="Title 1">
+            <a:extLst>
+              <a:ext uri="{FF2B5EF4-FFF2-40B4-BE49-F238E27FC236}">
+                <a16:creationId xmlns:a16="http://schemas.microsoft.com/office/drawing/2014/main" id="{F7664402-BFC1-3942-BF18-9287F8CC0E25}"/>
+              </a:ext>
+            </a:extLst>
+          </p:cNvPr>
+          <p:cNvSpPr>
+            <a:spLocks noGrp="1"/>
+          </p:cNvSpPr>
+          <p:nvPr>
+            <p:ph type="title"/>
+          </p:nvPr>
+        </p:nvSpPr>
+        <p:spPr/>
+        <p:txBody>
+          <a:bodyPr/>
+          <a:lstStyle/>
+          <a:p>
+            <a:r>
+              <a:rPr lang="en-US" dirty="0"/>
+              <a:t>DO NOW</a:t>
+            </a:r>
+          </a:p>
+        </p:txBody>
+      </p:sp>
+      <p:sp>
+        <p:nvSpPr>
+          <p:cNvPr id="3" name="Content Placeholder 2">
+            <a:extLst>
+              <a:ext uri="{FF2B5EF4-FFF2-40B4-BE49-F238E27FC236}">
+                <a16:creationId xmlns:a16="http://schemas.microsoft.com/office/drawing/2014/main" id="{78FA24F4-ABE5-1B49-89AC-1E2B99FBD80A}"/>
+              </a:ext>
+            </a:extLst>
+          </p:cNvPr>
+          <p:cNvSpPr>
+            <a:spLocks noGrp="1"/>
+          </p:cNvSpPr>
+          <p:nvPr>
+            <p:ph idx="1"/>
+          </p:nvPr>
+        </p:nvSpPr>
+        <p:spPr/>
+        <p:txBody>
+          <a:bodyPr/>
+          <a:lstStyle/>
+          <a:p>
+            <a:r>
+              <a:rPr lang="en-US" dirty="0"/>
+              <a:t>Name this tool</a:t>
+            </a:r>
+          </a:p>
+        </p:txBody>
+      </p:sp>
+      <p:sp>
+        <p:nvSpPr>
+          <p:cNvPr id="4" name="Footer Placeholder 3">
+            <a:extLst>
+              <a:ext uri="{FF2B5EF4-FFF2-40B4-BE49-F238E27FC236}">
+                <a16:creationId xmlns:a16="http://schemas.microsoft.com/office/drawing/2014/main" id="{18C212A2-5106-9B40-AEE1-8AC194BD1596}"/>
+              </a:ext>
+            </a:extLst>
+          </p:cNvPr>
+          <p:cNvSpPr>
+            <a:spLocks noGrp="1"/>
+          </p:cNvSpPr>
+          <p:nvPr>
+            <p:ph type="ftr" sz="quarter" idx="11"/>
+          </p:nvPr>
+        </p:nvSpPr>
+        <p:spPr/>
+        <p:txBody>
+          <a:bodyPr/>
+          <a:lstStyle/>
+          <a:p>
+            <a:r>
+              <a:rPr lang="en-US"/>
+              <a:t>Add a footer</a:t>
+            </a:r>
+            <a:endParaRPr lang="en-US" dirty="0"/>
+          </a:p>
+        </p:txBody>
+      </p:sp>
+      <p:pic>
+        <p:nvPicPr>
+          <p:cNvPr id="1026" name="Picture 2">
+            <a:extLst>
+              <a:ext uri="{FF2B5EF4-FFF2-40B4-BE49-F238E27FC236}">
+                <a16:creationId xmlns:a16="http://schemas.microsoft.com/office/drawing/2014/main" id="{C8EED7BD-EFF4-8D4D-A07E-C6F0482090A1}"/>
+              </a:ext>
+            </a:extLst>
+          </p:cNvPr>
+          <p:cNvPicPr>
+            <a:picLocks noChangeAspect="1" noChangeArrowheads="1"/>
+          </p:cNvPicPr>
+          <p:nvPr/>
+        </p:nvPicPr>
+        <p:blipFill>
+          <a:blip r:embed="rId2">
+            <a:extLst>
+              <a:ext uri="{28A0092B-C50C-407E-A947-70E740481C1C}">
+                <a14:useLocalDpi xmlns:a14="http://schemas.microsoft.com/office/drawing/2010/main" val="0"/>
+              </a:ext>
+            </a:extLst>
+          </a:blip>
+          <a:srcRect/>
+          <a:stretch>
+            <a:fillRect/>
+          </a:stretch>
+        </p:blipFill>
+        <p:spPr bwMode="auto">
+          <a:xfrm>
+            <a:off x="4870553" y="103216"/>
+            <a:ext cx="6761237" cy="6761237"/>
+          </a:xfrm>
+          <a:prstGeom prst="rect">
+            <a:avLst/>
+          </a:prstGeom>
+          <a:noFill/>
+          <a:extLst>
+            <a:ext uri="{909E8E84-426E-40DD-AFC4-6F175D3DCCD1}">
+              <a14:hiddenFill xmlns:a14="http://schemas.microsoft.com/office/drawing/2010/main">
+                <a:solidFill>
+                  <a:srgbClr val="FFFFFF"/>
+                </a:solidFill>
+              </a14:hiddenFill>
+            </a:ext>
+          </a:extLst>
+        </p:spPr>
+      </p:pic>
+    </p:spTree>
+    <p:extLst>
+      <p:ext uri="{BB962C8B-B14F-4D97-AF65-F5344CB8AC3E}">
+        <p14:creationId xmlns:p14="http://schemas.microsoft.com/office/powerpoint/2010/main" val="2826918779"/>
+      </p:ext>
+    </p:extLst>
+  </p:cSld>
+  <p:clrMapOvr>
+    <a:masterClrMapping/>
+  </p:clrMapOvr>
+  <mc:AlternateContent xmlns:mc="http://schemas.openxmlformats.org/markup-compatibility/2006" xmlns:p14="http://schemas.microsoft.com/office/powerpoint/2010/main">
+    <mc:Choice Requires="p14">
+      <p:transition spd="med" p14:dur="700">
+        <p:fade/>
+      </p:transition>
+    </mc:Choice>
+    <mc:Fallback xmlns="">
+      <p:transition spd="med">
+        <p:fade/>
+      </p:transition>
+    </mc:Fallback>
+  </mc:AlternateContent>
+</p:sld>
+</file>
+
+<file path=ppt/slides/slide3.xml><?xml version="1.0" encoding="utf-8"?>
+<p:sld xmlns:a="http://schemas.openxmlformats.org/drawingml/2006/main" xmlns:r="http://schemas.openxmlformats.org/officeDocument/2006/relationships" xmlns:p="http://schemas.openxmlformats.org/presentationml/2006/main">
+  <p:cSld>
+    <p:spTree>
+      <p:nvGrpSpPr>
+        <p:cNvPr id="1" name=""/>
+        <p:cNvGrpSpPr/>
+        <p:nvPr/>
+      </p:nvGrpSpPr>
+      <p:grpSpPr>
+        <a:xfrm>
+          <a:off x="0" y="0"/>
+          <a:ext cx="0" cy="0"/>
+          <a:chOff x="0" y="0"/>
+          <a:chExt cx="0" cy="0"/>
+        </a:xfrm>
+      </p:grpSpPr>
+      <p:sp>
+        <p:nvSpPr>
           <p:cNvPr id="2" name="Title 1"/>
           <p:cNvSpPr>
             <a:spLocks noGrp="1"/>
@@ -4090,7 +4265,7 @@
 </p:sld>
 </file>
 
-<file path=ppt/slides/slide3.xml><?xml version="1.0" encoding="utf-8"?>
+<file path=ppt/slides/slide4.xml><?xml version="1.0" encoding="utf-8"?>
 <p:sld xmlns:a="http://schemas.openxmlformats.org/drawingml/2006/main" xmlns:r="http://schemas.openxmlformats.org/officeDocument/2006/relationships" xmlns:p="http://schemas.openxmlformats.org/presentationml/2006/main">
   <p:cSld>
     <p:spTree>
@@ -4438,185 +4613,6 @@
 </p:sld>
 </file>
 
-<file path=ppt/slides/slide4.xml><?xml version="1.0" encoding="utf-8"?>
-<p:sld xmlns:a="http://schemas.openxmlformats.org/drawingml/2006/main" xmlns:r="http://schemas.openxmlformats.org/officeDocument/2006/relationships" xmlns:p="http://schemas.openxmlformats.org/presentationml/2006/main">
-  <p:cSld>
-    <p:spTree>
-      <p:nvGrpSpPr>
-        <p:cNvPr id="1" name=""/>
-        <p:cNvGrpSpPr/>
-        <p:nvPr/>
-      </p:nvGrpSpPr>
-      <p:grpSpPr>
-        <a:xfrm>
-          <a:off x="0" y="0"/>
-          <a:ext cx="0" cy="0"/>
-          <a:chOff x="0" y="0"/>
-          <a:chExt cx="0" cy="0"/>
-        </a:xfrm>
-      </p:grpSpPr>
-      <p:sp>
-        <p:nvSpPr>
-          <p:cNvPr id="2" name="Title 1">
-            <a:extLst>
-              <a:ext uri="{FF2B5EF4-FFF2-40B4-BE49-F238E27FC236}">
-                <a16:creationId xmlns:a16="http://schemas.microsoft.com/office/drawing/2014/main" id="{61394203-28C9-4A43-8A11-14CA82EE02A5}"/>
-              </a:ext>
-            </a:extLst>
-          </p:cNvPr>
-          <p:cNvSpPr>
-            <a:spLocks noGrp="1"/>
-          </p:cNvSpPr>
-          <p:nvPr>
-            <p:ph type="title"/>
-          </p:nvPr>
-        </p:nvSpPr>
-        <p:spPr/>
-        <p:txBody>
-          <a:bodyPr/>
-          <a:lstStyle/>
-          <a:p>
-            <a:r>
-              <a:rPr lang="en-US" dirty="0"/>
-              <a:t>Google Classroom codes</a:t>
-            </a:r>
-          </a:p>
-        </p:txBody>
-      </p:sp>
-      <p:sp>
-        <p:nvSpPr>
-          <p:cNvPr id="5" name="Content Placeholder 4">
-            <a:extLst>
-              <a:ext uri="{FF2B5EF4-FFF2-40B4-BE49-F238E27FC236}">
-                <a16:creationId xmlns:a16="http://schemas.microsoft.com/office/drawing/2014/main" id="{C899960E-945F-40C4-A024-C6ADA9C40C98}"/>
-              </a:ext>
-            </a:extLst>
-          </p:cNvPr>
-          <p:cNvSpPr>
-            <a:spLocks noGrp="1"/>
-          </p:cNvSpPr>
-          <p:nvPr>
-            <p:ph sz="half" idx="1"/>
-          </p:nvPr>
-        </p:nvSpPr>
-        <p:spPr/>
-        <p:txBody>
-          <a:bodyPr/>
-          <a:lstStyle/>
-          <a:p>
-            <a:pPr marL="0" indent="0" algn="ctr">
-              <a:buNone/>
-            </a:pPr>
-            <a:r>
-              <a:rPr lang="en-US" dirty="0"/>
-              <a:t>Photography</a:t>
-            </a:r>
-          </a:p>
-          <a:p>
-            <a:pPr marL="0" indent="0" algn="ctr">
-              <a:buNone/>
-            </a:pPr>
-            <a:r>
-              <a:rPr lang="en-US" sz="8800" dirty="0" err="1"/>
-              <a:t>rhxkpt</a:t>
-            </a:r>
-            <a:endParaRPr lang="en-US" sz="8800" dirty="0"/>
-          </a:p>
-        </p:txBody>
-      </p:sp>
-      <p:sp>
-        <p:nvSpPr>
-          <p:cNvPr id="6" name="Content Placeholder 5">
-            <a:extLst>
-              <a:ext uri="{FF2B5EF4-FFF2-40B4-BE49-F238E27FC236}">
-                <a16:creationId xmlns:a16="http://schemas.microsoft.com/office/drawing/2014/main" id="{EBD5C901-D1F0-4B7A-8780-F3ED9541C9D8}"/>
-              </a:ext>
-            </a:extLst>
-          </p:cNvPr>
-          <p:cNvSpPr>
-            <a:spLocks noGrp="1"/>
-          </p:cNvSpPr>
-          <p:nvPr>
-            <p:ph sz="half" idx="2"/>
-          </p:nvPr>
-        </p:nvSpPr>
-        <p:spPr/>
-        <p:txBody>
-          <a:bodyPr/>
-          <a:lstStyle/>
-          <a:p>
-            <a:pPr marL="0" indent="0" algn="ctr">
-              <a:buNone/>
-            </a:pPr>
-            <a:r>
-              <a:rPr lang="en-US" dirty="0"/>
-              <a:t>ADV Photography</a:t>
-            </a:r>
-          </a:p>
-          <a:p>
-            <a:pPr marL="0" indent="0" algn="ctr">
-              <a:buNone/>
-            </a:pPr>
-            <a:r>
-              <a:rPr lang="en-US" sz="8800" dirty="0"/>
-              <a:t>7mdo2ur</a:t>
-            </a:r>
-          </a:p>
-        </p:txBody>
-      </p:sp>
-      <p:sp>
-        <p:nvSpPr>
-          <p:cNvPr id="4" name="Footer Placeholder 3">
-            <a:extLst>
-              <a:ext uri="{FF2B5EF4-FFF2-40B4-BE49-F238E27FC236}">
-                <a16:creationId xmlns:a16="http://schemas.microsoft.com/office/drawing/2014/main" id="{CDEC51F9-A7E0-46DE-88C4-4B2F0BAB370A}"/>
-              </a:ext>
-            </a:extLst>
-          </p:cNvPr>
-          <p:cNvSpPr>
-            <a:spLocks noGrp="1"/>
-          </p:cNvSpPr>
-          <p:nvPr>
-            <p:ph type="ftr" sz="quarter" idx="11"/>
-          </p:nvPr>
-        </p:nvSpPr>
-        <p:spPr/>
-        <p:txBody>
-          <a:bodyPr/>
-          <a:lstStyle/>
-          <a:p>
-            <a:r>
-              <a:rPr lang="en-US" dirty="0"/>
-              <a:t>Unit 1 – Section 1 - Day 1</a:t>
-            </a:r>
-          </a:p>
-        </p:txBody>
-      </p:sp>
-    </p:spTree>
-    <p:extLst>
-      <p:ext uri="{BB962C8B-B14F-4D97-AF65-F5344CB8AC3E}">
-        <p14:creationId xmlns:p14="http://schemas.microsoft.com/office/powerpoint/2010/main" val="3560035554"/>
-      </p:ext>
-    </p:extLst>
-  </p:cSld>
-  <p:clrMapOvr>
-    <a:masterClrMapping/>
-  </p:clrMapOvr>
-  <mc:AlternateContent xmlns:mc="http://schemas.openxmlformats.org/markup-compatibility/2006" xmlns:p14="http://schemas.microsoft.com/office/powerpoint/2010/main">
-    <mc:Choice Requires="p14">
-      <p:transition spd="med" p14:dur="700">
-        <p:fade/>
-      </p:transition>
-    </mc:Choice>
-    <mc:Fallback xmlns="">
-      <p:transition spd="med">
-        <p:fade/>
-      </p:transition>
-    </mc:Fallback>
-  </mc:AlternateContent>
-</p:sld>
-</file>
-
 <file path=ppt/slides/slide5.xml><?xml version="1.0" encoding="utf-8"?>
 <p:sld xmlns:a="http://schemas.openxmlformats.org/drawingml/2006/main" xmlns:r="http://schemas.openxmlformats.org/officeDocument/2006/relationships" xmlns:p="http://schemas.openxmlformats.org/presentationml/2006/main">
   <p:cSld>
@@ -4669,7 +4665,7 @@
         <p:spPr/>
         <p:txBody>
           <a:bodyPr>
-            <a:normAutofit fontScale="92500" lnSpcReduction="10000"/>
+            <a:normAutofit lnSpcReduction="10000"/>
           </a:bodyPr>
           <a:lstStyle/>
           <a:p>
@@ -4685,7 +4681,7 @@
               <a:rPr lang="en-US" dirty="0">
                 <a:cs typeface="Arial" pitchFamily="34" charset="0"/>
               </a:rPr>
-              <a:t>A test is also provided before and at the end of each unit</a:t>
+              <a:t>A test is provided before and at the end of each unit</a:t>
             </a:r>
           </a:p>
           <a:p>
@@ -4693,80 +4689,80 @@
               <a:rPr lang="en-US" b="1" dirty="0">
                 <a:cs typeface="Arial" pitchFamily="34" charset="0"/>
               </a:rPr>
-              <a:t>Units (First Half Analog Units)</a:t>
+              <a:t>Units</a:t>
             </a:r>
           </a:p>
           <a:p>
             <a:pPr lvl="1"/>
             <a:r>
-              <a:rPr lang="en-US" dirty="0">
+              <a:rPr lang="en-US" b="1" dirty="0">
                 <a:cs typeface="Arial" pitchFamily="34" charset="0"/>
               </a:rPr>
-              <a:t>Introduction &amp; History</a:t>
+              <a:t>Safety</a:t>
             </a:r>
           </a:p>
           <a:p>
             <a:pPr lvl="1"/>
             <a:r>
-              <a:rPr lang="en-US" dirty="0">
+              <a:rPr lang="en-US" b="1" dirty="0">
                 <a:cs typeface="Arial" pitchFamily="34" charset="0"/>
               </a:rPr>
-              <a:t>Using An Enlarger</a:t>
+              <a:t>Design Process</a:t>
             </a:r>
           </a:p>
           <a:p>
             <a:pPr lvl="1"/>
             <a:r>
-              <a:rPr lang="en-US" dirty="0">
+              <a:rPr lang="en-US" b="1" dirty="0">
                 <a:cs typeface="Arial" pitchFamily="34" charset="0"/>
               </a:rPr>
-              <a:t>Camera Obscura</a:t>
+              <a:t>Exploring Technology</a:t>
             </a:r>
           </a:p>
           <a:p>
             <a:pPr lvl="1"/>
             <a:r>
-              <a:rPr lang="en-US" dirty="0">
+              <a:rPr lang="en-US" b="1" dirty="0">
                 <a:cs typeface="Arial" pitchFamily="34" charset="0"/>
               </a:rPr>
-              <a:t>Composition and Principles of Design</a:t>
+              <a:t>Design and Engineering</a:t>
             </a:r>
           </a:p>
           <a:p>
             <a:pPr lvl="1"/>
             <a:r>
-              <a:rPr lang="en-US" dirty="0">
+              <a:rPr lang="en-US" b="1">
                 <a:cs typeface="Arial" pitchFamily="34" charset="0"/>
               </a:rPr>
-              <a:t>SLR Camera Usage</a:t>
-            </a:r>
+              <a:t>Manufacturing For Masses</a:t>
+            </a:r>
+            <a:endParaRPr lang="en-US" b="1" dirty="0">
+              <a:cs typeface="Arial" pitchFamily="34" charset="0"/>
+            </a:endParaRPr>
           </a:p>
           <a:p>
             <a:pPr lvl="1"/>
             <a:r>
-              <a:rPr lang="en-US" dirty="0">
+              <a:rPr lang="en-US" b="1" dirty="0">
                 <a:cs typeface="Arial" pitchFamily="34" charset="0"/>
               </a:rPr>
-              <a:t>SLR Camera Film Development</a:t>
+              <a:t>Technology Systems</a:t>
             </a:r>
           </a:p>
           <a:p>
             <a:pPr lvl="1"/>
             <a:r>
-              <a:rPr lang="en-US" dirty="0">
+              <a:rPr lang="en-US" b="1" dirty="0">
                 <a:cs typeface="Arial" pitchFamily="34" charset="0"/>
               </a:rPr>
-              <a:t>SLR Camera Film Enlargement</a:t>
+              <a:t>CAD</a:t>
             </a:r>
           </a:p>
           <a:p>
             <a:pPr lvl="1"/>
-            <a:r>
-              <a:rPr lang="en-US" dirty="0">
-                <a:cs typeface="Arial" pitchFamily="34" charset="0"/>
-              </a:rPr>
-              <a:t>2 Perspective Picture Frame</a:t>
-            </a:r>
+            <a:endParaRPr lang="en-US" dirty="0">
+              <a:cs typeface="Arial" pitchFamily="34" charset="0"/>
+            </a:endParaRPr>
           </a:p>
         </p:txBody>
       </p:sp>

</xml_diff>